<commit_message>
derniere modif avant la fin
</commit_message>
<xml_diff>
--- a/PrésentationBooki.pptx
+++ b/PrésentationBooki.pptx
@@ -14,7 +14,8 @@
     <p:sldId id="262" r:id="rId8"/>
     <p:sldId id="263" r:id="rId9"/>
     <p:sldId id="264" r:id="rId10"/>
-    <p:sldId id="265" r:id="rId11"/>
+    <p:sldId id="266" r:id="rId11"/>
+    <p:sldId id="265" r:id="rId12"/>
   </p:sldIdLst>
   <p:sldSz cx="12192000" cy="6858000"/>
   <p:notesSz cx="6858000" cy="9144000"/>
@@ -113,6 +114,11 @@
       </a:defRPr>
     </a:lvl9pPr>
   </p:defaultTextStyle>
+  <p:extLst>
+    <p:ext uri="{EFAFB233-063F-42B5-8137-9DF3F51BA10A}">
+      <p15:sldGuideLst xmlns:p15="http://schemas.microsoft.com/office/powerpoint/2012/main"/>
+    </p:ext>
+  </p:extLst>
 </p:presentation>
 </file>
 
@@ -263,7 +269,7 @@
           <a:p>
             <a:fld id="{517DB6EA-6C98-B945-8CCB-75AEE2D13526}" type="datetimeFigureOut">
               <a:rPr lang="fr-FR" smtClean="0"/>
-              <a:t>28/10/2021</a:t>
+              <a:t>01/11/2021</a:t>
             </a:fld>
             <a:endParaRPr lang="fr-FR"/>
           </a:p>
@@ -461,7 +467,7 @@
           <a:p>
             <a:fld id="{517DB6EA-6C98-B945-8CCB-75AEE2D13526}" type="datetimeFigureOut">
               <a:rPr lang="fr-FR" smtClean="0"/>
-              <a:t>28/10/2021</a:t>
+              <a:t>01/11/2021</a:t>
             </a:fld>
             <a:endParaRPr lang="fr-FR"/>
           </a:p>
@@ -669,7 +675,7 @@
           <a:p>
             <a:fld id="{517DB6EA-6C98-B945-8CCB-75AEE2D13526}" type="datetimeFigureOut">
               <a:rPr lang="fr-FR" smtClean="0"/>
-              <a:t>28/10/2021</a:t>
+              <a:t>01/11/2021</a:t>
             </a:fld>
             <a:endParaRPr lang="fr-FR"/>
           </a:p>
@@ -867,7 +873,7 @@
           <a:p>
             <a:fld id="{517DB6EA-6C98-B945-8CCB-75AEE2D13526}" type="datetimeFigureOut">
               <a:rPr lang="fr-FR" smtClean="0"/>
-              <a:t>28/10/2021</a:t>
+              <a:t>01/11/2021</a:t>
             </a:fld>
             <a:endParaRPr lang="fr-FR"/>
           </a:p>
@@ -1142,7 +1148,7 @@
           <a:p>
             <a:fld id="{517DB6EA-6C98-B945-8CCB-75AEE2D13526}" type="datetimeFigureOut">
               <a:rPr lang="fr-FR" smtClean="0"/>
-              <a:t>28/10/2021</a:t>
+              <a:t>01/11/2021</a:t>
             </a:fld>
             <a:endParaRPr lang="fr-FR"/>
           </a:p>
@@ -1407,7 +1413,7 @@
           <a:p>
             <a:fld id="{517DB6EA-6C98-B945-8CCB-75AEE2D13526}" type="datetimeFigureOut">
               <a:rPr lang="fr-FR" smtClean="0"/>
-              <a:t>28/10/2021</a:t>
+              <a:t>01/11/2021</a:t>
             </a:fld>
             <a:endParaRPr lang="fr-FR"/>
           </a:p>
@@ -1819,7 +1825,7 @@
           <a:p>
             <a:fld id="{517DB6EA-6C98-B945-8CCB-75AEE2D13526}" type="datetimeFigureOut">
               <a:rPr lang="fr-FR" smtClean="0"/>
-              <a:t>28/10/2021</a:t>
+              <a:t>01/11/2021</a:t>
             </a:fld>
             <a:endParaRPr lang="fr-FR"/>
           </a:p>
@@ -1960,7 +1966,7 @@
           <a:p>
             <a:fld id="{517DB6EA-6C98-B945-8CCB-75AEE2D13526}" type="datetimeFigureOut">
               <a:rPr lang="fr-FR" smtClean="0"/>
-              <a:t>28/10/2021</a:t>
+              <a:t>01/11/2021</a:t>
             </a:fld>
             <a:endParaRPr lang="fr-FR"/>
           </a:p>
@@ -2073,7 +2079,7 @@
           <a:p>
             <a:fld id="{517DB6EA-6C98-B945-8CCB-75AEE2D13526}" type="datetimeFigureOut">
               <a:rPr lang="fr-FR" smtClean="0"/>
-              <a:t>28/10/2021</a:t>
+              <a:t>01/11/2021</a:t>
             </a:fld>
             <a:endParaRPr lang="fr-FR"/>
           </a:p>
@@ -2384,7 +2390,7 @@
           <a:p>
             <a:fld id="{517DB6EA-6C98-B945-8CCB-75AEE2D13526}" type="datetimeFigureOut">
               <a:rPr lang="fr-FR" smtClean="0"/>
-              <a:t>28/10/2021</a:t>
+              <a:t>01/11/2021</a:t>
             </a:fld>
             <a:endParaRPr lang="fr-FR"/>
           </a:p>
@@ -2672,7 +2678,7 @@
           <a:p>
             <a:fld id="{517DB6EA-6C98-B945-8CCB-75AEE2D13526}" type="datetimeFigureOut">
               <a:rPr lang="fr-FR" smtClean="0"/>
-              <a:t>28/10/2021</a:t>
+              <a:t>01/11/2021</a:t>
             </a:fld>
             <a:endParaRPr lang="fr-FR"/>
           </a:p>
@@ -2913,7 +2919,7 @@
           <a:p>
             <a:fld id="{517DB6EA-6C98-B945-8CCB-75AEE2D13526}" type="datetimeFigureOut">
               <a:rPr lang="fr-FR" smtClean="0"/>
-              <a:t>28/10/2021</a:t>
+              <a:t>01/11/2021</a:t>
             </a:fld>
             <a:endParaRPr lang="fr-FR"/>
           </a:p>
@@ -3456,6 +3462,214 @@
           <a:chExt cx="0" cy="0"/>
         </a:xfrm>
       </p:grpSpPr>
+      <p:sp>
+        <p:nvSpPr>
+          <p:cNvPr id="2" name="Titre 1">
+            <a:extLst>
+              <a:ext uri="{FF2B5EF4-FFF2-40B4-BE49-F238E27FC236}">
+                <a16:creationId xmlns:a16="http://schemas.microsoft.com/office/drawing/2014/main" id="{071A2779-9FDF-294C-88D9-A2607843047E}"/>
+              </a:ext>
+            </a:extLst>
+          </p:cNvPr>
+          <p:cNvSpPr>
+            <a:spLocks noGrp="1"/>
+          </p:cNvSpPr>
+          <p:nvPr>
+            <p:ph type="title"/>
+          </p:nvPr>
+        </p:nvSpPr>
+        <p:spPr/>
+        <p:txBody>
+          <a:bodyPr/>
+          <a:lstStyle/>
+          <a:p>
+            <a:r>
+              <a:rPr lang="fr-FR" dirty="0"/>
+              <a:t>Conclusion</a:t>
+            </a:r>
+          </a:p>
+        </p:txBody>
+      </p:sp>
+      <p:sp>
+        <p:nvSpPr>
+          <p:cNvPr id="3" name="Espace réservé du contenu 2">
+            <a:extLst>
+              <a:ext uri="{FF2B5EF4-FFF2-40B4-BE49-F238E27FC236}">
+                <a16:creationId xmlns:a16="http://schemas.microsoft.com/office/drawing/2014/main" id="{F8E32CC9-6A99-3E4F-BE8A-3D1BC36B3632}"/>
+              </a:ext>
+            </a:extLst>
+          </p:cNvPr>
+          <p:cNvSpPr>
+            <a:spLocks noGrp="1"/>
+          </p:cNvSpPr>
+          <p:nvPr>
+            <p:ph idx="1"/>
+          </p:nvPr>
+        </p:nvSpPr>
+        <p:spPr/>
+        <p:txBody>
+          <a:bodyPr/>
+          <a:lstStyle/>
+          <a:p>
+            <a:r>
+              <a:rPr lang="fr-FR" dirty="0"/>
+              <a:t>Aime et pas aimer </a:t>
+            </a:r>
+          </a:p>
+          <a:p>
+            <a:r>
+              <a:rPr lang="fr-FR" dirty="0"/>
+              <a:t>Expliquer un peu plus des </a:t>
+            </a:r>
+            <a:r>
+              <a:rPr lang="fr-FR" dirty="0" err="1"/>
+              <a:t>elements</a:t>
+            </a:r>
+            <a:r>
+              <a:rPr lang="fr-FR" dirty="0"/>
+              <a:t> de </a:t>
+            </a:r>
+            <a:r>
+              <a:rPr lang="fr-FR" dirty="0" err="1"/>
+              <a:t>details</a:t>
+            </a:r>
+            <a:endParaRPr lang="fr-FR" dirty="0"/>
+          </a:p>
+          <a:p>
+            <a:r>
+              <a:rPr lang="fr-FR" dirty="0"/>
+              <a:t>Retour d’</a:t>
+            </a:r>
+            <a:r>
+              <a:rPr lang="fr-FR" dirty="0" err="1"/>
+              <a:t>eperience</a:t>
+            </a:r>
+            <a:endParaRPr lang="fr-FR" dirty="0"/>
+          </a:p>
+          <a:p>
+            <a:r>
+              <a:rPr lang="fr-FR" dirty="0" err="1"/>
+              <a:t>Difficulte</a:t>
+            </a:r>
+            <a:r>
+              <a:rPr lang="fr-FR" dirty="0"/>
+              <a:t> pour </a:t>
+            </a:r>
+            <a:r>
+              <a:rPr lang="fr-FR" dirty="0" err="1"/>
+              <a:t>definir</a:t>
+            </a:r>
+            <a:r>
+              <a:rPr lang="fr-FR" dirty="0"/>
+              <a:t> la </a:t>
+            </a:r>
+            <a:r>
+              <a:rPr lang="fr-FR" dirty="0" err="1"/>
+              <a:t>precision</a:t>
+            </a:r>
+            <a:r>
+              <a:rPr lang="fr-FR" dirty="0"/>
+              <a:t> a cause de maquette </a:t>
+            </a:r>
+            <a:r>
+              <a:rPr lang="fr-FR" dirty="0" err="1"/>
+              <a:t>pdf</a:t>
+            </a:r>
+            <a:r>
+              <a:rPr lang="fr-FR" dirty="0"/>
+              <a:t> et </a:t>
+            </a:r>
+            <a:r>
+              <a:rPr lang="fr-FR" dirty="0" err="1"/>
+              <a:t>psd</a:t>
+            </a:r>
+            <a:endParaRPr lang="fr-FR" dirty="0"/>
+          </a:p>
+          <a:p>
+            <a:r>
+              <a:rPr lang="fr-FR" dirty="0" err="1"/>
+              <a:t>Diff</a:t>
+            </a:r>
+            <a:r>
+              <a:rPr lang="fr-FR" dirty="0"/>
+              <a:t> pour </a:t>
+            </a:r>
+            <a:r>
+              <a:rPr lang="fr-FR" dirty="0" err="1"/>
+              <a:t>integration</a:t>
+            </a:r>
+            <a:r>
+              <a:rPr lang="fr-FR" dirty="0"/>
+              <a:t> mobile sur maquette </a:t>
+            </a:r>
+            <a:r>
+              <a:rPr lang="fr-FR" dirty="0" err="1"/>
+              <a:t>iphone</a:t>
+            </a:r>
+            <a:r>
+              <a:rPr lang="fr-FR" dirty="0"/>
+              <a:t> 8 alors que sur </a:t>
+            </a:r>
+            <a:r>
+              <a:rPr lang="fr-FR" dirty="0" err="1"/>
+              <a:t>brief</a:t>
+            </a:r>
+            <a:r>
+              <a:rPr lang="fr-FR" dirty="0"/>
+              <a:t> 768px</a:t>
+            </a:r>
+          </a:p>
+          <a:p>
+            <a:r>
+              <a:rPr lang="fr-FR" dirty="0"/>
+              <a:t>Parler du rendu populaire a cause de la </a:t>
+            </a:r>
+            <a:r>
+              <a:rPr lang="fr-FR" dirty="0" err="1"/>
+              <a:t>width</a:t>
+            </a:r>
+            <a:r>
+              <a:rPr lang="fr-FR" dirty="0"/>
+              <a:t> de la </a:t>
+            </a:r>
+            <a:r>
+              <a:rPr lang="fr-FR"/>
+              <a:t>descritpion</a:t>
+            </a:r>
+            <a:endParaRPr lang="fr-FR" dirty="0"/>
+          </a:p>
+        </p:txBody>
+      </p:sp>
+    </p:spTree>
+    <p:extLst>
+      <p:ext uri="{BB962C8B-B14F-4D97-AF65-F5344CB8AC3E}">
+        <p14:creationId xmlns:p14="http://schemas.microsoft.com/office/powerpoint/2010/main" val="1431620317"/>
+      </p:ext>
+    </p:extLst>
+  </p:cSld>
+  <p:clrMapOvr>
+    <a:masterClrMapping/>
+  </p:clrMapOvr>
+</p:sld>
+</file>
+
+<file path=ppt/slides/slide11.xml><?xml version="1.0" encoding="utf-8"?>
+<p:sld xmlns:a="http://schemas.openxmlformats.org/drawingml/2006/main" xmlns:r="http://schemas.openxmlformats.org/officeDocument/2006/relationships" xmlns:p="http://schemas.openxmlformats.org/presentationml/2006/main">
+  <p:cSld>
+    <p:spTree>
+      <p:nvGrpSpPr>
+        <p:cNvPr id="1" name=""/>
+        <p:cNvGrpSpPr/>
+        <p:nvPr/>
+      </p:nvGrpSpPr>
+      <p:grpSpPr>
+        <a:xfrm>
+          <a:off x="0" y="0"/>
+          <a:ext cx="0" cy="0"/>
+          <a:chOff x="0" y="0"/>
+          <a:chExt cx="0" cy="0"/>
+        </a:xfrm>
+      </p:grpSpPr>
       <p:pic>
         <p:nvPicPr>
           <p:cNvPr id="5" name="Espace réservé du contenu 4">
@@ -3799,7 +4013,7 @@
                 </a:solidFill>
                 <a:latin typeface="Raleway" pitchFamily="2" charset="77"/>
               </a:rPr>
-              <a:t>Booky</a:t>
+              <a:t>Booki</a:t>
             </a:r>
             <a:r>
               <a:rPr lang="fr-FR" dirty="0">

</xml_diff>